<commit_message>
Cleaned up the buttons, got them nested propperly, also removed the transitions, looks much cleaner(to me)
</commit_message>
<xml_diff>
--- a/ToDoMatrix Design Doc.pptx
+++ b/ToDoMatrix Design Doc.pptx
@@ -106,6 +106,11 @@
       </a:defRPr>
     </a:lvl9pPr>
   </p:defaultTextStyle>
+  <p:extLst>
+    <p:ext uri="{EFAFB233-063F-42B5-8137-9DF3F51BA10A}">
+      <p15:sldGuideLst xmlns:p15="http://schemas.microsoft.com/office/powerpoint/2012/main"/>
+    </p:ext>
+  </p:extLst>
 </p:presentation>
 </file>
 
@@ -258,7 +263,7 @@
           <a:p>
             <a:fld id="{CEAD9804-A4DC-4DA4-BD92-423AEB00816A}" type="datetimeFigureOut">
               <a:rPr lang="en-CA" smtClean="0"/>
-              <a:t>2020-04-08</a:t>
+              <a:t>2020-04-10</a:t>
             </a:fld>
             <a:endParaRPr lang="en-CA"/>
           </a:p>
@@ -458,7 +463,7 @@
           <a:p>
             <a:fld id="{CEAD9804-A4DC-4DA4-BD92-423AEB00816A}" type="datetimeFigureOut">
               <a:rPr lang="en-CA" smtClean="0"/>
-              <a:t>2020-04-08</a:t>
+              <a:t>2020-04-10</a:t>
             </a:fld>
             <a:endParaRPr lang="en-CA"/>
           </a:p>
@@ -668,7 +673,7 @@
           <a:p>
             <a:fld id="{CEAD9804-A4DC-4DA4-BD92-423AEB00816A}" type="datetimeFigureOut">
               <a:rPr lang="en-CA" smtClean="0"/>
-              <a:t>2020-04-08</a:t>
+              <a:t>2020-04-10</a:t>
             </a:fld>
             <a:endParaRPr lang="en-CA"/>
           </a:p>
@@ -868,7 +873,7 @@
           <a:p>
             <a:fld id="{CEAD9804-A4DC-4DA4-BD92-423AEB00816A}" type="datetimeFigureOut">
               <a:rPr lang="en-CA" smtClean="0"/>
-              <a:t>2020-04-08</a:t>
+              <a:t>2020-04-10</a:t>
             </a:fld>
             <a:endParaRPr lang="en-CA"/>
           </a:p>
@@ -1144,7 +1149,7 @@
           <a:p>
             <a:fld id="{CEAD9804-A4DC-4DA4-BD92-423AEB00816A}" type="datetimeFigureOut">
               <a:rPr lang="en-CA" smtClean="0"/>
-              <a:t>2020-04-08</a:t>
+              <a:t>2020-04-10</a:t>
             </a:fld>
             <a:endParaRPr lang="en-CA"/>
           </a:p>
@@ -1412,7 +1417,7 @@
           <a:p>
             <a:fld id="{CEAD9804-A4DC-4DA4-BD92-423AEB00816A}" type="datetimeFigureOut">
               <a:rPr lang="en-CA" smtClean="0"/>
-              <a:t>2020-04-08</a:t>
+              <a:t>2020-04-10</a:t>
             </a:fld>
             <a:endParaRPr lang="en-CA"/>
           </a:p>
@@ -1827,7 +1832,7 @@
           <a:p>
             <a:fld id="{CEAD9804-A4DC-4DA4-BD92-423AEB00816A}" type="datetimeFigureOut">
               <a:rPr lang="en-CA" smtClean="0"/>
-              <a:t>2020-04-08</a:t>
+              <a:t>2020-04-10</a:t>
             </a:fld>
             <a:endParaRPr lang="en-CA"/>
           </a:p>
@@ -1969,7 +1974,7 @@
           <a:p>
             <a:fld id="{CEAD9804-A4DC-4DA4-BD92-423AEB00816A}" type="datetimeFigureOut">
               <a:rPr lang="en-CA" smtClean="0"/>
-              <a:t>2020-04-08</a:t>
+              <a:t>2020-04-10</a:t>
             </a:fld>
             <a:endParaRPr lang="en-CA"/>
           </a:p>
@@ -2082,7 +2087,7 @@
           <a:p>
             <a:fld id="{CEAD9804-A4DC-4DA4-BD92-423AEB00816A}" type="datetimeFigureOut">
               <a:rPr lang="en-CA" smtClean="0"/>
-              <a:t>2020-04-08</a:t>
+              <a:t>2020-04-10</a:t>
             </a:fld>
             <a:endParaRPr lang="en-CA"/>
           </a:p>
@@ -2395,7 +2400,7 @@
           <a:p>
             <a:fld id="{CEAD9804-A4DC-4DA4-BD92-423AEB00816A}" type="datetimeFigureOut">
               <a:rPr lang="en-CA" smtClean="0"/>
-              <a:t>2020-04-08</a:t>
+              <a:t>2020-04-10</a:t>
             </a:fld>
             <a:endParaRPr lang="en-CA"/>
           </a:p>
@@ -2684,7 +2689,7 @@
           <a:p>
             <a:fld id="{CEAD9804-A4DC-4DA4-BD92-423AEB00816A}" type="datetimeFigureOut">
               <a:rPr lang="en-CA" smtClean="0"/>
-              <a:t>2020-04-08</a:t>
+              <a:t>2020-04-10</a:t>
             </a:fld>
             <a:endParaRPr lang="en-CA"/>
           </a:p>
@@ -2927,7 +2932,7 @@
           <a:p>
             <a:fld id="{CEAD9804-A4DC-4DA4-BD92-423AEB00816A}" type="datetimeFigureOut">
               <a:rPr lang="en-CA" smtClean="0"/>
-              <a:t>2020-04-08</a:t>
+              <a:t>2020-04-10</a:t>
             </a:fld>
             <a:endParaRPr lang="en-CA"/>
           </a:p>

</xml_diff>